<commit_message>
Chagned book types in order_book Updated architecture document
</commit_message>
<xml_diff>
--- a/docs/system_kr-architecture.pptx
+++ b/docs/system_kr-architecture.pptx
@@ -293,7 +293,7 @@
           <a:p>
             <a:fld id="{1E474B2E-4983-C647-8CE3-153FA8977472}" type="datetimeFigureOut">
               <a:rPr lang="en-US" smtClean="0"/>
-              <a:t>3/22/13</a:t>
+              <a:t>3/28/13</a:t>
             </a:fld>
             <a:endParaRPr lang="en-US"/>
           </a:p>
@@ -463,7 +463,7 @@
           <a:p>
             <a:fld id="{1E474B2E-4983-C647-8CE3-153FA8977472}" type="datetimeFigureOut">
               <a:rPr lang="en-US" smtClean="0"/>
-              <a:t>3/22/13</a:t>
+              <a:t>3/28/13</a:t>
             </a:fld>
             <a:endParaRPr lang="en-US"/>
           </a:p>
@@ -643,7 +643,7 @@
           <a:p>
             <a:fld id="{1E474B2E-4983-C647-8CE3-153FA8977472}" type="datetimeFigureOut">
               <a:rPr lang="en-US" smtClean="0"/>
-              <a:t>3/22/13</a:t>
+              <a:t>3/28/13</a:t>
             </a:fld>
             <a:endParaRPr lang="en-US"/>
           </a:p>
@@ -813,7 +813,7 @@
           <a:p>
             <a:fld id="{1E474B2E-4983-C647-8CE3-153FA8977472}" type="datetimeFigureOut">
               <a:rPr lang="en-US" smtClean="0"/>
-              <a:t>3/22/13</a:t>
+              <a:t>3/28/13</a:t>
             </a:fld>
             <a:endParaRPr lang="en-US"/>
           </a:p>
@@ -1059,7 +1059,7 @@
           <a:p>
             <a:fld id="{1E474B2E-4983-C647-8CE3-153FA8977472}" type="datetimeFigureOut">
               <a:rPr lang="en-US" smtClean="0"/>
-              <a:t>3/22/13</a:t>
+              <a:t>3/28/13</a:t>
             </a:fld>
             <a:endParaRPr lang="en-US"/>
           </a:p>
@@ -1347,7 +1347,7 @@
           <a:p>
             <a:fld id="{1E474B2E-4983-C647-8CE3-153FA8977472}" type="datetimeFigureOut">
               <a:rPr lang="en-US" smtClean="0"/>
-              <a:t>3/22/13</a:t>
+              <a:t>3/28/13</a:t>
             </a:fld>
             <a:endParaRPr lang="en-US"/>
           </a:p>
@@ -1769,7 +1769,7 @@
           <a:p>
             <a:fld id="{1E474B2E-4983-C647-8CE3-153FA8977472}" type="datetimeFigureOut">
               <a:rPr lang="en-US" smtClean="0"/>
-              <a:t>3/22/13</a:t>
+              <a:t>3/28/13</a:t>
             </a:fld>
             <a:endParaRPr lang="en-US"/>
           </a:p>
@@ -1887,7 +1887,7 @@
           <a:p>
             <a:fld id="{1E474B2E-4983-C647-8CE3-153FA8977472}" type="datetimeFigureOut">
               <a:rPr lang="en-US" smtClean="0"/>
-              <a:t>3/22/13</a:t>
+              <a:t>3/28/13</a:t>
             </a:fld>
             <a:endParaRPr lang="en-US"/>
           </a:p>
@@ -1982,7 +1982,7 @@
           <a:p>
             <a:fld id="{1E474B2E-4983-C647-8CE3-153FA8977472}" type="datetimeFigureOut">
               <a:rPr lang="en-US" smtClean="0"/>
-              <a:t>3/22/13</a:t>
+              <a:t>3/28/13</a:t>
             </a:fld>
             <a:endParaRPr lang="en-US"/>
           </a:p>
@@ -2259,7 +2259,7 @@
           <a:p>
             <a:fld id="{1E474B2E-4983-C647-8CE3-153FA8977472}" type="datetimeFigureOut">
               <a:rPr lang="en-US" smtClean="0"/>
-              <a:t>3/22/13</a:t>
+              <a:t>3/28/13</a:t>
             </a:fld>
             <a:endParaRPr lang="en-US"/>
           </a:p>
@@ -2512,7 +2512,7 @@
           <a:p>
             <a:fld id="{1E474B2E-4983-C647-8CE3-153FA8977472}" type="datetimeFigureOut">
               <a:rPr lang="en-US" smtClean="0"/>
-              <a:t>3/22/13</a:t>
+              <a:t>3/28/13</a:t>
             </a:fld>
             <a:endParaRPr lang="en-US"/>
           </a:p>
@@ -2725,7 +2725,7 @@
           <a:p>
             <a:fld id="{1E474B2E-4983-C647-8CE3-153FA8977472}" type="datetimeFigureOut">
               <a:rPr lang="en-US" smtClean="0"/>
-              <a:t>3/22/13</a:t>
+              <a:t>3/28/13</a:t>
             </a:fld>
             <a:endParaRPr lang="en-US"/>
           </a:p>
@@ -4448,7 +4448,6 @@
               <a:rPr lang="en-US" sz="1400" dirty="0" smtClean="0"/>
               <a:t>Stream</a:t>
             </a:r>
-            <a:endParaRPr lang="en-US" sz="1400" dirty="0" smtClean="0"/>
           </a:p>
         </p:txBody>
       </p:sp>

</xml_diff>